<commit_message>
Added some visualization in results
</commit_message>
<xml_diff>
--- a/Blindness Detection Presentation.pptx
+++ b/Blindness Detection Presentation.pptx
@@ -5,7 +5,7 @@
     <p:sldMasterId id="2147483648" r:id="rId1"/>
   </p:sldMasterIdLst>
   <p:notesMasterIdLst>
-    <p:notesMasterId r:id="rId10"/>
+    <p:notesMasterId r:id="rId13"/>
   </p:notesMasterIdLst>
   <p:sldIdLst>
     <p:sldId id="256" r:id="rId2"/>
@@ -16,28 +16,31 @@
     <p:sldId id="270" r:id="rId7"/>
     <p:sldId id="271" r:id="rId8"/>
     <p:sldId id="272" r:id="rId9"/>
+    <p:sldId id="273" r:id="rId10"/>
+    <p:sldId id="275" r:id="rId11"/>
+    <p:sldId id="274" r:id="rId12"/>
   </p:sldIdLst>
   <p:sldSz cx="9144000" cy="5143500" type="screen16x9"/>
   <p:notesSz cx="6858000" cy="9144000"/>
   <p:embeddedFontLst>
     <p:embeddedFont>
       <p:font typeface="Corbel" panose="020B0503020204020204" pitchFamily="34" charset="0"/>
-      <p:regular r:id="rId11"/>
-      <p:bold r:id="rId12"/>
-      <p:italic r:id="rId13"/>
-      <p:boldItalic r:id="rId14"/>
+      <p:regular r:id="rId14"/>
+      <p:bold r:id="rId15"/>
+      <p:italic r:id="rId16"/>
+      <p:boldItalic r:id="rId17"/>
     </p:embeddedFont>
     <p:embeddedFont>
       <p:font typeface="Lato" panose="020F0502020204030203" pitchFamily="34" charset="0"/>
-      <p:regular r:id="rId15"/>
-      <p:bold r:id="rId16"/>
-      <p:italic r:id="rId17"/>
-      <p:boldItalic r:id="rId18"/>
+      <p:regular r:id="rId18"/>
+      <p:bold r:id="rId19"/>
+      <p:italic r:id="rId20"/>
+      <p:boldItalic r:id="rId21"/>
     </p:embeddedFont>
     <p:embeddedFont>
       <p:font typeface="Raleway ExtraBold" pitchFamily="2" charset="0"/>
-      <p:bold r:id="rId19"/>
-      <p:boldItalic r:id="rId20"/>
+      <p:bold r:id="rId22"/>
+      <p:boldItalic r:id="rId23"/>
     </p:embeddedFont>
   </p:embeddedFontLst>
   <p:defaultTextStyle>
@@ -285,7 +288,7 @@
       </p15:sldGuideLst>
     </p:ext>
     <p:ext uri="http://customooxmlschemas.google.com/">
-      <go:slidesCustomData xmlns:go="http://customooxmlschemas.google.com/" xmlns:ahyp="http://schemas.microsoft.com/office/drawing/2018/hyperlinkcolor" xmlns:p15="http://schemas.microsoft.com/office/powerpoint/2012/main" xmlns:p14="http://schemas.microsoft.com/office/powerpoint/2010/main" xmlns:com="http://schemas.openxmlformats.org/drawingml/2006/compatibility" xmlns:pvml="urn:schemas-microsoft-com:office:powerpoint" xmlns:v="urn:schemas-microsoft-com:vml" xmlns:o="urn:schemas-microsoft-com:office:office" xmlns:dgm="http://schemas.openxmlformats.org/drawingml/2006/diagram" xmlns:c="http://schemas.openxmlformats.org/drawingml/2006/chart" xmlns:mv="urn:schemas-microsoft-com:mac:vml" xmlns:mc="http://schemas.openxmlformats.org/markup-compatibility/2006" xmlns="" r:id="rId29" roundtripDataSignature="AMtx7mhGRjcg0Yqg7aDT2RBWlna5YBA7+Q=="/>
+      <go:slidesCustomData xmlns="" xmlns:mc="http://schemas.openxmlformats.org/markup-compatibility/2006" xmlns:mv="urn:schemas-microsoft-com:mac:vml" xmlns:c="http://schemas.openxmlformats.org/drawingml/2006/chart" xmlns:dgm="http://schemas.openxmlformats.org/drawingml/2006/diagram" xmlns:o="urn:schemas-microsoft-com:office:office" xmlns:v="urn:schemas-microsoft-com:vml" xmlns:pvml="urn:schemas-microsoft-com:office:powerpoint" xmlns:com="http://schemas.openxmlformats.org/drawingml/2006/compatibility" xmlns:p14="http://schemas.microsoft.com/office/powerpoint/2010/main" xmlns:p15="http://schemas.microsoft.com/office/powerpoint/2012/main" xmlns:ahyp="http://schemas.microsoft.com/office/drawing/2018/hyperlinkcolor" xmlns:go="http://customooxmlschemas.google.com/" r:id="rId29" roundtripDataSignature="AMtx7mhGRjcg0Yqg7aDT2RBWlna5YBA7+Q=="/>
     </p:ext>
   </p:extLst>
 </p:presentation>
@@ -3098,6 +3101,260 @@
 </p:notes>
 </file>
 
+<file path=ppt/notesSlides/notesSlide10.xml><?xml version="1.0" encoding="utf-8"?>
+<p:notes xmlns:a="http://schemas.openxmlformats.org/drawingml/2006/main" xmlns:r="http://schemas.openxmlformats.org/officeDocument/2006/relationships" xmlns:p="http://schemas.openxmlformats.org/presentationml/2006/main" showMasterSp="0" showMasterPhAnim="0">
+  <p:cSld>
+    <p:spTree>
+      <p:nvGrpSpPr>
+        <p:cNvPr id="1" name="Shape 155"/>
+        <p:cNvGrpSpPr/>
+        <p:nvPr/>
+      </p:nvGrpSpPr>
+      <p:grpSpPr>
+        <a:xfrm>
+          <a:off x="0" y="0"/>
+          <a:ext cx="0" cy="0"/>
+          <a:chOff x="0" y="0"/>
+          <a:chExt cx="0" cy="0"/>
+        </a:xfrm>
+      </p:grpSpPr>
+      <p:sp>
+        <p:nvSpPr>
+          <p:cNvPr id="156" name="Google Shape;156;p2:notes"/>
+          <p:cNvSpPr>
+            <a:spLocks noGrp="1" noRot="1" noChangeAspect="1"/>
+          </p:cNvSpPr>
+          <p:nvPr>
+            <p:ph type="sldImg" idx="2"/>
+          </p:nvPr>
+        </p:nvSpPr>
+        <p:spPr>
+          <a:xfrm>
+            <a:off x="381000" y="685800"/>
+            <a:ext cx="6096000" cy="3429000"/>
+          </a:xfrm>
+          <a:custGeom>
+            <a:avLst/>
+            <a:gdLst/>
+            <a:ahLst/>
+            <a:cxnLst/>
+            <a:rect l="l" t="t" r="r" b="b"/>
+            <a:pathLst>
+              <a:path w="120000" h="120000" extrusionOk="0">
+                <a:moveTo>
+                  <a:pt x="0" y="0"/>
+                </a:moveTo>
+                <a:lnTo>
+                  <a:pt x="120000" y="0"/>
+                </a:lnTo>
+                <a:lnTo>
+                  <a:pt x="120000" y="120000"/>
+                </a:lnTo>
+                <a:lnTo>
+                  <a:pt x="0" y="120000"/>
+                </a:lnTo>
+                <a:close/>
+              </a:path>
+            </a:pathLst>
+          </a:custGeom>
+          <a:noFill/>
+          <a:ln w="9525" cap="flat" cmpd="sng">
+            <a:solidFill>
+              <a:srgbClr val="000000"/>
+            </a:solidFill>
+            <a:prstDash val="solid"/>
+            <a:round/>
+            <a:headEnd type="none" w="sm" len="sm"/>
+            <a:tailEnd type="none" w="sm" len="sm"/>
+          </a:ln>
+        </p:spPr>
+      </p:sp>
+      <p:sp>
+        <p:nvSpPr>
+          <p:cNvPr id="157" name="Google Shape;157;p2:notes"/>
+          <p:cNvSpPr txBox="1">
+            <a:spLocks noGrp="1"/>
+          </p:cNvSpPr>
+          <p:nvPr>
+            <p:ph type="body" idx="1"/>
+          </p:nvPr>
+        </p:nvSpPr>
+        <p:spPr>
+          <a:xfrm>
+            <a:off x="685800" y="4343400"/>
+            <a:ext cx="5486400" cy="4114800"/>
+          </a:xfrm>
+          <a:prstGeom prst="rect">
+            <a:avLst/>
+          </a:prstGeom>
+          <a:noFill/>
+          <a:ln>
+            <a:noFill/>
+          </a:ln>
+        </p:spPr>
+        <p:txBody>
+          <a:bodyPr spcFirstLastPara="1" wrap="square" lIns="91425" tIns="91425" rIns="91425" bIns="91425" anchor="t" anchorCtr="0">
+            <a:noAutofit/>
+          </a:bodyPr>
+          <a:lstStyle/>
+          <a:p>
+            <a:pPr marL="0" lvl="0" indent="0" algn="l" rtl="0">
+              <a:lnSpc>
+                <a:spcPct val="100000"/>
+              </a:lnSpc>
+              <a:spcBef>
+                <a:spcPts val="0"/>
+              </a:spcBef>
+              <a:spcAft>
+                <a:spcPts val="0"/>
+              </a:spcAft>
+              <a:buSzPts val="1100"/>
+              <a:buNone/>
+            </a:pPr>
+            <a:endParaRPr/>
+          </a:p>
+        </p:txBody>
+      </p:sp>
+    </p:spTree>
+    <p:extLst>
+      <p:ext uri="{BB962C8B-B14F-4D97-AF65-F5344CB8AC3E}">
+        <p14:creationId xmlns:p14="http://schemas.microsoft.com/office/powerpoint/2010/main" val="3955643755"/>
+      </p:ext>
+    </p:extLst>
+  </p:cSld>
+  <p:clrMapOvr>
+    <a:masterClrMapping/>
+  </p:clrMapOvr>
+</p:notes>
+</file>
+
+<file path=ppt/notesSlides/notesSlide11.xml><?xml version="1.0" encoding="utf-8"?>
+<p:notes xmlns:a="http://schemas.openxmlformats.org/drawingml/2006/main" xmlns:r="http://schemas.openxmlformats.org/officeDocument/2006/relationships" xmlns:p="http://schemas.openxmlformats.org/presentationml/2006/main" showMasterSp="0" showMasterPhAnim="0">
+  <p:cSld>
+    <p:spTree>
+      <p:nvGrpSpPr>
+        <p:cNvPr id="1" name="Shape 155"/>
+        <p:cNvGrpSpPr/>
+        <p:nvPr/>
+      </p:nvGrpSpPr>
+      <p:grpSpPr>
+        <a:xfrm>
+          <a:off x="0" y="0"/>
+          <a:ext cx="0" cy="0"/>
+          <a:chOff x="0" y="0"/>
+          <a:chExt cx="0" cy="0"/>
+        </a:xfrm>
+      </p:grpSpPr>
+      <p:sp>
+        <p:nvSpPr>
+          <p:cNvPr id="156" name="Google Shape;156;p2:notes"/>
+          <p:cNvSpPr>
+            <a:spLocks noGrp="1" noRot="1" noChangeAspect="1"/>
+          </p:cNvSpPr>
+          <p:nvPr>
+            <p:ph type="sldImg" idx="2"/>
+          </p:nvPr>
+        </p:nvSpPr>
+        <p:spPr>
+          <a:xfrm>
+            <a:off x="381000" y="685800"/>
+            <a:ext cx="6096000" cy="3429000"/>
+          </a:xfrm>
+          <a:custGeom>
+            <a:avLst/>
+            <a:gdLst/>
+            <a:ahLst/>
+            <a:cxnLst/>
+            <a:rect l="l" t="t" r="r" b="b"/>
+            <a:pathLst>
+              <a:path w="120000" h="120000" extrusionOk="0">
+                <a:moveTo>
+                  <a:pt x="0" y="0"/>
+                </a:moveTo>
+                <a:lnTo>
+                  <a:pt x="120000" y="0"/>
+                </a:lnTo>
+                <a:lnTo>
+                  <a:pt x="120000" y="120000"/>
+                </a:lnTo>
+                <a:lnTo>
+                  <a:pt x="0" y="120000"/>
+                </a:lnTo>
+                <a:close/>
+              </a:path>
+            </a:pathLst>
+          </a:custGeom>
+          <a:noFill/>
+          <a:ln w="9525" cap="flat" cmpd="sng">
+            <a:solidFill>
+              <a:srgbClr val="000000"/>
+            </a:solidFill>
+            <a:prstDash val="solid"/>
+            <a:round/>
+            <a:headEnd type="none" w="sm" len="sm"/>
+            <a:tailEnd type="none" w="sm" len="sm"/>
+          </a:ln>
+        </p:spPr>
+      </p:sp>
+      <p:sp>
+        <p:nvSpPr>
+          <p:cNvPr id="157" name="Google Shape;157;p2:notes"/>
+          <p:cNvSpPr txBox="1">
+            <a:spLocks noGrp="1"/>
+          </p:cNvSpPr>
+          <p:nvPr>
+            <p:ph type="body" idx="1"/>
+          </p:nvPr>
+        </p:nvSpPr>
+        <p:spPr>
+          <a:xfrm>
+            <a:off x="685800" y="4343400"/>
+            <a:ext cx="5486400" cy="4114800"/>
+          </a:xfrm>
+          <a:prstGeom prst="rect">
+            <a:avLst/>
+          </a:prstGeom>
+          <a:noFill/>
+          <a:ln>
+            <a:noFill/>
+          </a:ln>
+        </p:spPr>
+        <p:txBody>
+          <a:bodyPr spcFirstLastPara="1" wrap="square" lIns="91425" tIns="91425" rIns="91425" bIns="91425" anchor="t" anchorCtr="0">
+            <a:noAutofit/>
+          </a:bodyPr>
+          <a:lstStyle/>
+          <a:p>
+            <a:pPr marL="0" lvl="0" indent="0" algn="l" rtl="0">
+              <a:lnSpc>
+                <a:spcPct val="100000"/>
+              </a:lnSpc>
+              <a:spcBef>
+                <a:spcPts val="0"/>
+              </a:spcBef>
+              <a:spcAft>
+                <a:spcPts val="0"/>
+              </a:spcAft>
+              <a:buSzPts val="1100"/>
+              <a:buNone/>
+            </a:pPr>
+            <a:endParaRPr/>
+          </a:p>
+        </p:txBody>
+      </p:sp>
+    </p:spTree>
+    <p:extLst>
+      <p:ext uri="{BB962C8B-B14F-4D97-AF65-F5344CB8AC3E}">
+        <p14:creationId xmlns:p14="http://schemas.microsoft.com/office/powerpoint/2010/main" val="3647443312"/>
+      </p:ext>
+    </p:extLst>
+  </p:cSld>
+  <p:clrMapOvr>
+    <a:masterClrMapping/>
+  </p:clrMapOvr>
+</p:notes>
+</file>
+
 <file path=ppt/notesSlides/notesSlide2.xml><?xml version="1.0" encoding="utf-8"?>
 <p:notes xmlns:a="http://schemas.openxmlformats.org/drawingml/2006/main" xmlns:r="http://schemas.openxmlformats.org/officeDocument/2006/relationships" xmlns:p="http://schemas.openxmlformats.org/presentationml/2006/main" showMasterSp="0" showMasterPhAnim="0">
   <p:cSld>
@@ -3973,6 +4230,133 @@
     <p:extLst>
       <p:ext uri="{BB962C8B-B14F-4D97-AF65-F5344CB8AC3E}">
         <p14:creationId xmlns:p14="http://schemas.microsoft.com/office/powerpoint/2010/main" val="503965965"/>
+      </p:ext>
+    </p:extLst>
+  </p:cSld>
+  <p:clrMapOvr>
+    <a:masterClrMapping/>
+  </p:clrMapOvr>
+</p:notes>
+</file>
+
+<file path=ppt/notesSlides/notesSlide9.xml><?xml version="1.0" encoding="utf-8"?>
+<p:notes xmlns:a="http://schemas.openxmlformats.org/drawingml/2006/main" xmlns:r="http://schemas.openxmlformats.org/officeDocument/2006/relationships" xmlns:p="http://schemas.openxmlformats.org/presentationml/2006/main" showMasterSp="0" showMasterPhAnim="0">
+  <p:cSld>
+    <p:spTree>
+      <p:nvGrpSpPr>
+        <p:cNvPr id="1" name="Shape 155"/>
+        <p:cNvGrpSpPr/>
+        <p:nvPr/>
+      </p:nvGrpSpPr>
+      <p:grpSpPr>
+        <a:xfrm>
+          <a:off x="0" y="0"/>
+          <a:ext cx="0" cy="0"/>
+          <a:chOff x="0" y="0"/>
+          <a:chExt cx="0" cy="0"/>
+        </a:xfrm>
+      </p:grpSpPr>
+      <p:sp>
+        <p:nvSpPr>
+          <p:cNvPr id="156" name="Google Shape;156;p2:notes"/>
+          <p:cNvSpPr>
+            <a:spLocks noGrp="1" noRot="1" noChangeAspect="1"/>
+          </p:cNvSpPr>
+          <p:nvPr>
+            <p:ph type="sldImg" idx="2"/>
+          </p:nvPr>
+        </p:nvSpPr>
+        <p:spPr>
+          <a:xfrm>
+            <a:off x="381000" y="685800"/>
+            <a:ext cx="6096000" cy="3429000"/>
+          </a:xfrm>
+          <a:custGeom>
+            <a:avLst/>
+            <a:gdLst/>
+            <a:ahLst/>
+            <a:cxnLst/>
+            <a:rect l="l" t="t" r="r" b="b"/>
+            <a:pathLst>
+              <a:path w="120000" h="120000" extrusionOk="0">
+                <a:moveTo>
+                  <a:pt x="0" y="0"/>
+                </a:moveTo>
+                <a:lnTo>
+                  <a:pt x="120000" y="0"/>
+                </a:lnTo>
+                <a:lnTo>
+                  <a:pt x="120000" y="120000"/>
+                </a:lnTo>
+                <a:lnTo>
+                  <a:pt x="0" y="120000"/>
+                </a:lnTo>
+                <a:close/>
+              </a:path>
+            </a:pathLst>
+          </a:custGeom>
+          <a:noFill/>
+          <a:ln w="9525" cap="flat" cmpd="sng">
+            <a:solidFill>
+              <a:srgbClr val="000000"/>
+            </a:solidFill>
+            <a:prstDash val="solid"/>
+            <a:round/>
+            <a:headEnd type="none" w="sm" len="sm"/>
+            <a:tailEnd type="none" w="sm" len="sm"/>
+          </a:ln>
+        </p:spPr>
+      </p:sp>
+      <p:sp>
+        <p:nvSpPr>
+          <p:cNvPr id="157" name="Google Shape;157;p2:notes"/>
+          <p:cNvSpPr txBox="1">
+            <a:spLocks noGrp="1"/>
+          </p:cNvSpPr>
+          <p:nvPr>
+            <p:ph type="body" idx="1"/>
+          </p:nvPr>
+        </p:nvSpPr>
+        <p:spPr>
+          <a:xfrm>
+            <a:off x="685800" y="4343400"/>
+            <a:ext cx="5486400" cy="4114800"/>
+          </a:xfrm>
+          <a:prstGeom prst="rect">
+            <a:avLst/>
+          </a:prstGeom>
+          <a:noFill/>
+          <a:ln>
+            <a:noFill/>
+          </a:ln>
+        </p:spPr>
+        <p:txBody>
+          <a:bodyPr spcFirstLastPara="1" wrap="square" lIns="91425" tIns="91425" rIns="91425" bIns="91425" anchor="t" anchorCtr="0">
+            <a:noAutofit/>
+          </a:bodyPr>
+          <a:lstStyle/>
+          <a:p>
+            <a:pPr marL="0" lvl="0" indent="0" algn="l" rtl="0">
+              <a:lnSpc>
+                <a:spcPct val="100000"/>
+              </a:lnSpc>
+              <a:spcBef>
+                <a:spcPts val="0"/>
+              </a:spcBef>
+              <a:spcAft>
+                <a:spcPts val="0"/>
+              </a:spcAft>
+              <a:buSzPts val="1100"/>
+              <a:buNone/>
+            </a:pPr>
+            <a:endParaRPr/>
+          </a:p>
+        </p:txBody>
+      </p:sp>
+    </p:spTree>
+    <p:extLst>
+      <p:ext uri="{BB962C8B-B14F-4D97-AF65-F5344CB8AC3E}">
+        <p14:creationId xmlns:p14="http://schemas.microsoft.com/office/powerpoint/2010/main" val="2723973182"/>
       </p:ext>
     </p:extLst>
   </p:cSld>
@@ -20901,6 +21285,368 @@
 </p:sld>
 </file>
 
+<file path=ppt/slides/slide10.xml><?xml version="1.0" encoding="utf-8"?>
+<p:sld xmlns:a="http://schemas.openxmlformats.org/drawingml/2006/main" xmlns:r="http://schemas.openxmlformats.org/officeDocument/2006/relationships" xmlns:p="http://schemas.openxmlformats.org/presentationml/2006/main">
+  <p:cSld>
+    <p:spTree>
+      <p:nvGrpSpPr>
+        <p:cNvPr id="1" name="Shape 158"/>
+        <p:cNvGrpSpPr/>
+        <p:nvPr/>
+      </p:nvGrpSpPr>
+      <p:grpSpPr>
+        <a:xfrm>
+          <a:off x="0" y="0"/>
+          <a:ext cx="0" cy="0"/>
+          <a:chOff x="0" y="0"/>
+          <a:chExt cx="0" cy="0"/>
+        </a:xfrm>
+      </p:grpSpPr>
+      <p:sp>
+        <p:nvSpPr>
+          <p:cNvPr id="3" name="Title 2">
+            <a:extLst>
+              <a:ext uri="{FF2B5EF4-FFF2-40B4-BE49-F238E27FC236}">
+                <a16:creationId xmlns:a16="http://schemas.microsoft.com/office/drawing/2014/main" id="{55A06791-28FA-228B-F912-94966CBEEE65}"/>
+              </a:ext>
+            </a:extLst>
+          </p:cNvPr>
+          <p:cNvSpPr>
+            <a:spLocks noGrp="1"/>
+          </p:cNvSpPr>
+          <p:nvPr>
+            <p:ph type="title"/>
+          </p:nvPr>
+        </p:nvSpPr>
+        <p:spPr>
+          <a:xfrm>
+            <a:off x="766664" y="99706"/>
+            <a:ext cx="7688400" cy="1518600"/>
+          </a:xfrm>
+        </p:spPr>
+        <p:txBody>
+          <a:bodyPr/>
+          <a:lstStyle/>
+          <a:p>
+            <a:r>
+              <a:rPr lang="en-US" dirty="0"/>
+              <a:t>Results Visualization</a:t>
+            </a:r>
+          </a:p>
+        </p:txBody>
+      </p:sp>
+      <p:pic>
+        <p:nvPicPr>
+          <p:cNvPr id="9" name="Picture 8">
+            <a:extLst>
+              <a:ext uri="{FF2B5EF4-FFF2-40B4-BE49-F238E27FC236}">
+                <a16:creationId xmlns:a16="http://schemas.microsoft.com/office/drawing/2014/main" id="{4E9643B5-7086-FB57-3016-8E834CA8EA9B}"/>
+              </a:ext>
+            </a:extLst>
+          </p:cNvPr>
+          <p:cNvPicPr>
+            <a:picLocks noChangeAspect="1"/>
+          </p:cNvPicPr>
+          <p:nvPr/>
+        </p:nvPicPr>
+        <p:blipFill rotWithShape="1">
+          <a:blip r:embed="rId3"/>
+          <a:srcRect b="33540"/>
+          <a:stretch/>
+        </p:blipFill>
+        <p:spPr>
+          <a:xfrm>
+            <a:off x="1243572" y="994146"/>
+            <a:ext cx="3722270" cy="3418366"/>
+          </a:xfrm>
+          <a:prstGeom prst="rect">
+            <a:avLst/>
+          </a:prstGeom>
+        </p:spPr>
+      </p:pic>
+      <p:pic>
+        <p:nvPicPr>
+          <p:cNvPr id="11" name="Picture 10">
+            <a:extLst>
+              <a:ext uri="{FF2B5EF4-FFF2-40B4-BE49-F238E27FC236}">
+                <a16:creationId xmlns:a16="http://schemas.microsoft.com/office/drawing/2014/main" id="{7106EC43-61D9-6240-15AF-FB474F4886FA}"/>
+              </a:ext>
+            </a:extLst>
+          </p:cNvPr>
+          <p:cNvPicPr>
+            <a:picLocks noChangeAspect="1"/>
+          </p:cNvPicPr>
+          <p:nvPr/>
+        </p:nvPicPr>
+        <p:blipFill rotWithShape="1">
+          <a:blip r:embed="rId3"/>
+          <a:srcRect t="65840"/>
+          <a:stretch/>
+        </p:blipFill>
+        <p:spPr>
+          <a:xfrm>
+            <a:off x="5039395" y="1047307"/>
+            <a:ext cx="3722270" cy="1757030"/>
+          </a:xfrm>
+          <a:prstGeom prst="rect">
+            <a:avLst/>
+          </a:prstGeom>
+        </p:spPr>
+      </p:pic>
+    </p:spTree>
+    <p:extLst>
+      <p:ext uri="{BB962C8B-B14F-4D97-AF65-F5344CB8AC3E}">
+        <p14:creationId xmlns:p14="http://schemas.microsoft.com/office/powerpoint/2010/main" val="2456988779"/>
+      </p:ext>
+    </p:extLst>
+  </p:cSld>
+  <p:clrMapOvr>
+    <a:masterClrMapping/>
+  </p:clrMapOvr>
+</p:sld>
+</file>
+
+<file path=ppt/slides/slide11.xml><?xml version="1.0" encoding="utf-8"?>
+<p:sld xmlns:a="http://schemas.openxmlformats.org/drawingml/2006/main" xmlns:r="http://schemas.openxmlformats.org/officeDocument/2006/relationships" xmlns:p="http://schemas.openxmlformats.org/presentationml/2006/main">
+  <p:cSld>
+    <p:spTree>
+      <p:nvGrpSpPr>
+        <p:cNvPr id="1" name="Shape 158"/>
+        <p:cNvGrpSpPr/>
+        <p:nvPr/>
+      </p:nvGrpSpPr>
+      <p:grpSpPr>
+        <a:xfrm>
+          <a:off x="0" y="0"/>
+          <a:ext cx="0" cy="0"/>
+          <a:chOff x="0" y="0"/>
+          <a:chExt cx="0" cy="0"/>
+        </a:xfrm>
+      </p:grpSpPr>
+      <p:sp>
+        <p:nvSpPr>
+          <p:cNvPr id="3" name="Title 2">
+            <a:extLst>
+              <a:ext uri="{FF2B5EF4-FFF2-40B4-BE49-F238E27FC236}">
+                <a16:creationId xmlns:a16="http://schemas.microsoft.com/office/drawing/2014/main" id="{55A06791-28FA-228B-F912-94966CBEEE65}"/>
+              </a:ext>
+            </a:extLst>
+          </p:cNvPr>
+          <p:cNvSpPr>
+            <a:spLocks noGrp="1"/>
+          </p:cNvSpPr>
+          <p:nvPr>
+            <p:ph type="title"/>
+          </p:nvPr>
+        </p:nvSpPr>
+        <p:spPr>
+          <a:xfrm>
+            <a:off x="766664" y="99706"/>
+            <a:ext cx="7688400" cy="1518600"/>
+          </a:xfrm>
+        </p:spPr>
+        <p:txBody>
+          <a:bodyPr/>
+          <a:lstStyle/>
+          <a:p>
+            <a:r>
+              <a:rPr lang="en-US" dirty="0"/>
+              <a:t>Planned Future Work</a:t>
+            </a:r>
+          </a:p>
+        </p:txBody>
+      </p:sp>
+      <p:sp>
+        <p:nvSpPr>
+          <p:cNvPr id="2" name="TextBox 1">
+            <a:extLst>
+              <a:ext uri="{FF2B5EF4-FFF2-40B4-BE49-F238E27FC236}">
+                <a16:creationId xmlns:a16="http://schemas.microsoft.com/office/drawing/2014/main" id="{79B1E69C-6737-DEF2-D995-BD872ECBE477}"/>
+              </a:ext>
+            </a:extLst>
+          </p:cNvPr>
+          <p:cNvSpPr txBox="1"/>
+          <p:nvPr/>
+        </p:nvSpPr>
+        <p:spPr>
+          <a:xfrm>
+            <a:off x="2030819" y="812432"/>
+            <a:ext cx="6028660" cy="2462213"/>
+          </a:xfrm>
+          <a:prstGeom prst="rect">
+            <a:avLst/>
+          </a:prstGeom>
+          <a:noFill/>
+        </p:spPr>
+        <p:txBody>
+          <a:bodyPr wrap="square" rtlCol="0">
+            <a:spAutoFit/>
+          </a:bodyPr>
+          <a:lstStyle/>
+          <a:p>
+            <a:pPr marL="285750" indent="-285750">
+              <a:buClr>
+                <a:schemeClr val="bg1"/>
+              </a:buClr>
+              <a:buFont typeface="Arial" panose="020B0604020202020204" pitchFamily="34" charset="0"/>
+              <a:buChar char="•"/>
+            </a:pPr>
+            <a:r>
+              <a:rPr lang="en-US" b="0" i="0" u="none" strike="noStrike" dirty="0">
+                <a:solidFill>
+                  <a:schemeClr val="bg1"/>
+                </a:solidFill>
+                <a:effectLst/>
+                <a:latin typeface="Arial" panose="020B0604020202020204" pitchFamily="34" charset="0"/>
+              </a:rPr>
+              <a:t>Evaluate on Test Data</a:t>
+            </a:r>
+          </a:p>
+          <a:p>
+            <a:pPr marL="285750" indent="-285750">
+              <a:buClr>
+                <a:schemeClr val="bg1"/>
+              </a:buClr>
+              <a:buFont typeface="Arial" panose="020B0604020202020204" pitchFamily="34" charset="0"/>
+              <a:buChar char="•"/>
+            </a:pPr>
+            <a:endParaRPr lang="en-US" b="0" i="0" u="none" strike="noStrike" dirty="0">
+              <a:solidFill>
+                <a:schemeClr val="bg1"/>
+              </a:solidFill>
+              <a:effectLst/>
+              <a:latin typeface="Arial" panose="020B0604020202020204" pitchFamily="34" charset="0"/>
+            </a:endParaRPr>
+          </a:p>
+          <a:p>
+            <a:pPr marL="285750" indent="-285750">
+              <a:buClr>
+                <a:schemeClr val="bg1"/>
+              </a:buClr>
+              <a:buFont typeface="Arial" panose="020B0604020202020204" pitchFamily="34" charset="0"/>
+              <a:buChar char="•"/>
+            </a:pPr>
+            <a:r>
+              <a:rPr lang="en-US" dirty="0">
+                <a:solidFill>
+                  <a:schemeClr val="bg1"/>
+                </a:solidFill>
+                <a:latin typeface="Arial" panose="020B0604020202020204" pitchFamily="34" charset="0"/>
+              </a:rPr>
+              <a:t>Perform logistic regression and ET decision trees</a:t>
+            </a:r>
+          </a:p>
+          <a:p>
+            <a:pPr marL="285750" indent="-285750">
+              <a:buClr>
+                <a:schemeClr val="bg1"/>
+              </a:buClr>
+              <a:buFont typeface="Arial" panose="020B0604020202020204" pitchFamily="34" charset="0"/>
+              <a:buChar char="•"/>
+            </a:pPr>
+            <a:endParaRPr lang="en-US" dirty="0">
+              <a:solidFill>
+                <a:schemeClr val="bg1"/>
+              </a:solidFill>
+              <a:latin typeface="Arial" panose="020B0604020202020204" pitchFamily="34" charset="0"/>
+            </a:endParaRPr>
+          </a:p>
+          <a:p>
+            <a:pPr marL="285750" indent="-285750">
+              <a:buClr>
+                <a:schemeClr val="bg1"/>
+              </a:buClr>
+              <a:buFont typeface="Arial" panose="020B0604020202020204" pitchFamily="34" charset="0"/>
+              <a:buChar char="•"/>
+            </a:pPr>
+            <a:r>
+              <a:rPr lang="en-US" b="0" i="0" u="none" strike="noStrike" dirty="0">
+                <a:solidFill>
+                  <a:schemeClr val="bg1"/>
+                </a:solidFill>
+                <a:effectLst/>
+                <a:latin typeface="Arial" panose="020B0604020202020204" pitchFamily="34" charset="0"/>
+              </a:rPr>
+              <a:t>Retrain the models with data augmentation and compare the results if data augmentation increases performance</a:t>
+            </a:r>
+          </a:p>
+          <a:p>
+            <a:pPr marL="285750" indent="-285750">
+              <a:buClr>
+                <a:schemeClr val="bg1"/>
+              </a:buClr>
+              <a:buFont typeface="Arial" panose="020B0604020202020204" pitchFamily="34" charset="0"/>
+              <a:buChar char="•"/>
+            </a:pPr>
+            <a:endParaRPr lang="en-US" dirty="0">
+              <a:solidFill>
+                <a:schemeClr val="bg1"/>
+              </a:solidFill>
+              <a:latin typeface="Arial" panose="020B0604020202020204" pitchFamily="34" charset="0"/>
+            </a:endParaRPr>
+          </a:p>
+          <a:p>
+            <a:pPr marL="285750" indent="-285750">
+              <a:buClr>
+                <a:schemeClr val="bg1"/>
+              </a:buClr>
+              <a:buFont typeface="Arial" panose="020B0604020202020204" pitchFamily="34" charset="0"/>
+              <a:buChar char="•"/>
+            </a:pPr>
+            <a:r>
+              <a:rPr lang="en-US" b="0" i="0" u="none" strike="noStrike" dirty="0">
+                <a:solidFill>
+                  <a:schemeClr val="bg1"/>
+                </a:solidFill>
+                <a:effectLst/>
+                <a:latin typeface="Arial" panose="020B0604020202020204" pitchFamily="34" charset="0"/>
+              </a:rPr>
+              <a:t>Continue tuning hyperparameters to increase accuracy without overfitting</a:t>
+            </a:r>
+          </a:p>
+          <a:p>
+            <a:pPr marL="285750" indent="-285750">
+              <a:buClr>
+                <a:schemeClr val="bg1"/>
+              </a:buClr>
+              <a:buFont typeface="Arial" panose="020B0604020202020204" pitchFamily="34" charset="0"/>
+              <a:buChar char="•"/>
+            </a:pPr>
+            <a:endParaRPr lang="en-US" dirty="0">
+              <a:solidFill>
+                <a:schemeClr val="bg1"/>
+              </a:solidFill>
+            </a:endParaRPr>
+          </a:p>
+          <a:p>
+            <a:pPr marL="285750" indent="-285750">
+              <a:buClr>
+                <a:schemeClr val="bg1"/>
+              </a:buClr>
+              <a:buFont typeface="Arial" panose="020B0604020202020204" pitchFamily="34" charset="0"/>
+              <a:buChar char="•"/>
+            </a:pPr>
+            <a:endParaRPr lang="en-US" dirty="0">
+              <a:solidFill>
+                <a:schemeClr val="bg1"/>
+              </a:solidFill>
+            </a:endParaRPr>
+          </a:p>
+        </p:txBody>
+      </p:sp>
+    </p:spTree>
+    <p:extLst>
+      <p:ext uri="{BB962C8B-B14F-4D97-AF65-F5344CB8AC3E}">
+        <p14:creationId xmlns:p14="http://schemas.microsoft.com/office/powerpoint/2010/main" val="2412890731"/>
+      </p:ext>
+    </p:extLst>
+  </p:cSld>
+  <p:clrMapOvr>
+    <a:masterClrMapping/>
+  </p:clrMapOvr>
+</p:sld>
+</file>
+
 <file path=ppt/slides/slide2.xml><?xml version="1.0" encoding="utf-8"?>
 <p:sld xmlns:a="http://schemas.openxmlformats.org/drawingml/2006/main" xmlns:r="http://schemas.openxmlformats.org/officeDocument/2006/relationships" xmlns:p="http://schemas.openxmlformats.org/presentationml/2006/main">
   <p:cSld>
@@ -21412,8 +22158,8 @@
         </p:nvSpPr>
         <p:spPr>
           <a:xfrm>
-            <a:off x="2340812" y="3410741"/>
-            <a:ext cx="2270051" cy="1600438"/>
+            <a:off x="2340812" y="3442639"/>
+            <a:ext cx="3714431" cy="1815882"/>
           </a:xfrm>
           <a:prstGeom prst="rect">
             <a:avLst/>
@@ -21441,7 +22187,7 @@
                 <a:effectLst/>
                 <a:latin typeface="+mj-lt"/>
               </a:rPr>
-              <a:t>0 - No DR</a:t>
+              <a:t>0 - No Diabetic Retinopathy</a:t>
             </a:r>
           </a:p>
           <a:p>
@@ -21502,7 +22248,7 @@
             </a:r>
           </a:p>
           <a:p>
-            <a:pPr marL="285750" indent="-285750" algn="l" fontAlgn="base">
+            <a:pPr marL="285750" indent="-285750" fontAlgn="base">
               <a:buClr>
                 <a:schemeClr val="bg1"/>
               </a:buClr>
@@ -21517,8 +22263,24 @@
                 <a:effectLst/>
                 <a:latin typeface="+mj-lt"/>
               </a:rPr>
-              <a:t>4 - Proliferative DR</a:t>
+              <a:t>4 - Proliferative Diabetic Retinopathy</a:t>
             </a:r>
+          </a:p>
+          <a:p>
+            <a:pPr marL="285750" indent="-285750" algn="l" fontAlgn="base">
+              <a:buClr>
+                <a:schemeClr val="bg1"/>
+              </a:buClr>
+              <a:buFont typeface="Arial" panose="020B0604020202020204" pitchFamily="34" charset="0"/>
+              <a:buChar char="•"/>
+            </a:pPr>
+            <a:endParaRPr lang="en-US" b="0" i="0" dirty="0">
+              <a:solidFill>
+                <a:schemeClr val="bg1"/>
+              </a:solidFill>
+              <a:effectLst/>
+              <a:latin typeface="+mj-lt"/>
+            </a:endParaRPr>
           </a:p>
           <a:p>
             <a:pPr marL="285750" indent="-285750">
@@ -22536,6 +23298,747 @@
     <p:extLst>
       <p:ext uri="{BB962C8B-B14F-4D97-AF65-F5344CB8AC3E}">
         <p14:creationId xmlns:p14="http://schemas.microsoft.com/office/powerpoint/2010/main" val="238913171"/>
+      </p:ext>
+    </p:extLst>
+  </p:cSld>
+  <p:clrMapOvr>
+    <a:masterClrMapping/>
+  </p:clrMapOvr>
+</p:sld>
+</file>
+
+<file path=ppt/slides/slide9.xml><?xml version="1.0" encoding="utf-8"?>
+<p:sld xmlns:a="http://schemas.openxmlformats.org/drawingml/2006/main" xmlns:r="http://schemas.openxmlformats.org/officeDocument/2006/relationships" xmlns:p="http://schemas.openxmlformats.org/presentationml/2006/main">
+  <p:cSld>
+    <p:spTree>
+      <p:nvGrpSpPr>
+        <p:cNvPr id="1" name="Shape 158"/>
+        <p:cNvGrpSpPr/>
+        <p:nvPr/>
+      </p:nvGrpSpPr>
+      <p:grpSpPr>
+        <a:xfrm>
+          <a:off x="0" y="0"/>
+          <a:ext cx="0" cy="0"/>
+          <a:chOff x="0" y="0"/>
+          <a:chExt cx="0" cy="0"/>
+        </a:xfrm>
+      </p:grpSpPr>
+      <p:sp>
+        <p:nvSpPr>
+          <p:cNvPr id="3" name="Title 2">
+            <a:extLst>
+              <a:ext uri="{FF2B5EF4-FFF2-40B4-BE49-F238E27FC236}">
+                <a16:creationId xmlns:a16="http://schemas.microsoft.com/office/drawing/2014/main" id="{55A06791-28FA-228B-F912-94966CBEEE65}"/>
+              </a:ext>
+            </a:extLst>
+          </p:cNvPr>
+          <p:cNvSpPr>
+            <a:spLocks noGrp="1"/>
+          </p:cNvSpPr>
+          <p:nvPr>
+            <p:ph type="title"/>
+          </p:nvPr>
+        </p:nvSpPr>
+        <p:spPr>
+          <a:xfrm>
+            <a:off x="766664" y="99706"/>
+            <a:ext cx="7688400" cy="1518600"/>
+          </a:xfrm>
+        </p:spPr>
+        <p:txBody>
+          <a:bodyPr/>
+          <a:lstStyle/>
+          <a:p>
+            <a:r>
+              <a:rPr lang="en-US" dirty="0"/>
+              <a:t>Results after Training</a:t>
+            </a:r>
+          </a:p>
+        </p:txBody>
+      </p:sp>
+      <p:graphicFrame>
+        <p:nvGraphicFramePr>
+          <p:cNvPr id="2" name="Table 4">
+            <a:extLst>
+              <a:ext uri="{FF2B5EF4-FFF2-40B4-BE49-F238E27FC236}">
+                <a16:creationId xmlns:a16="http://schemas.microsoft.com/office/drawing/2014/main" id="{FB718278-55CB-842B-44F3-9E7FC026204E}"/>
+              </a:ext>
+            </a:extLst>
+          </p:cNvPr>
+          <p:cNvGraphicFramePr>
+            <a:graphicFrameLocks noGrp="1"/>
+          </p:cNvGraphicFramePr>
+          <p:nvPr>
+            <p:extLst>
+              <p:ext uri="{D42A27DB-BD31-4B8C-83A1-F6EECF244321}">
+                <p14:modId xmlns:p14="http://schemas.microsoft.com/office/powerpoint/2010/main" val="3003311230"/>
+              </p:ext>
+            </p:extLst>
+          </p:nvPr>
+        </p:nvGraphicFramePr>
+        <p:xfrm>
+          <a:off x="103667" y="1618306"/>
+          <a:ext cx="8936665" cy="1594510"/>
+        </p:xfrm>
+        <a:graphic>
+          <a:graphicData uri="http://schemas.openxmlformats.org/drawingml/2006/table">
+            <a:tbl>
+              <a:tblPr firstRow="1" bandRow="1">
+                <a:tableStyleId>{5C22544A-7EE6-4342-B048-85BDC9FD1C3A}</a:tableStyleId>
+              </a:tblPr>
+              <a:tblGrid>
+                <a:gridCol w="1000805">
+                  <a:extLst>
+                    <a:ext uri="{9D8B030D-6E8A-4147-A177-3AD203B41FA5}">
+                      <a16:colId xmlns:a16="http://schemas.microsoft.com/office/drawing/2014/main" val="2608786438"/>
+                    </a:ext>
+                  </a:extLst>
+                </a:gridCol>
+                <a:gridCol w="874441">
+                  <a:extLst>
+                    <a:ext uri="{9D8B030D-6E8A-4147-A177-3AD203B41FA5}">
+                      <a16:colId xmlns:a16="http://schemas.microsoft.com/office/drawing/2014/main" val="2937430645"/>
+                    </a:ext>
+                  </a:extLst>
+                </a:gridCol>
+                <a:gridCol w="897824">
+                  <a:extLst>
+                    <a:ext uri="{9D8B030D-6E8A-4147-A177-3AD203B41FA5}">
+                      <a16:colId xmlns:a16="http://schemas.microsoft.com/office/drawing/2014/main" val="3413558513"/>
+                    </a:ext>
+                  </a:extLst>
+                </a:gridCol>
+                <a:gridCol w="801594">
+                  <a:extLst>
+                    <a:ext uri="{9D8B030D-6E8A-4147-A177-3AD203B41FA5}">
+                      <a16:colId xmlns:a16="http://schemas.microsoft.com/office/drawing/2014/main" val="3446600068"/>
+                    </a:ext>
+                  </a:extLst>
+                </a:gridCol>
+                <a:gridCol w="893667">
+                  <a:extLst>
+                    <a:ext uri="{9D8B030D-6E8A-4147-A177-3AD203B41FA5}">
+                      <a16:colId xmlns:a16="http://schemas.microsoft.com/office/drawing/2014/main" val="3763900091"/>
+                    </a:ext>
+                  </a:extLst>
+                </a:gridCol>
+                <a:gridCol w="893667">
+                  <a:extLst>
+                    <a:ext uri="{9D8B030D-6E8A-4147-A177-3AD203B41FA5}">
+                      <a16:colId xmlns:a16="http://schemas.microsoft.com/office/drawing/2014/main" val="3014481371"/>
+                    </a:ext>
+                  </a:extLst>
+                </a:gridCol>
+                <a:gridCol w="893667">
+                  <a:extLst>
+                    <a:ext uri="{9D8B030D-6E8A-4147-A177-3AD203B41FA5}">
+                      <a16:colId xmlns:a16="http://schemas.microsoft.com/office/drawing/2014/main" val="3632210339"/>
+                    </a:ext>
+                  </a:extLst>
+                </a:gridCol>
+                <a:gridCol w="893667">
+                  <a:extLst>
+                    <a:ext uri="{9D8B030D-6E8A-4147-A177-3AD203B41FA5}">
+                      <a16:colId xmlns:a16="http://schemas.microsoft.com/office/drawing/2014/main" val="1458811717"/>
+                    </a:ext>
+                  </a:extLst>
+                </a:gridCol>
+                <a:gridCol w="644332">
+                  <a:extLst>
+                    <a:ext uri="{9D8B030D-6E8A-4147-A177-3AD203B41FA5}">
+                      <a16:colId xmlns:a16="http://schemas.microsoft.com/office/drawing/2014/main" val="3509391455"/>
+                    </a:ext>
+                  </a:extLst>
+                </a:gridCol>
+                <a:gridCol w="1143001">
+                  <a:extLst>
+                    <a:ext uri="{9D8B030D-6E8A-4147-A177-3AD203B41FA5}">
+                      <a16:colId xmlns:a16="http://schemas.microsoft.com/office/drawing/2014/main" val="2563254493"/>
+                    </a:ext>
+                  </a:extLst>
+                </a:gridCol>
+              </a:tblGrid>
+              <a:tr h="419245">
+                <a:tc>
+                  <a:txBody>
+                    <a:bodyPr/>
+                    <a:lstStyle/>
+                    <a:p>
+                      <a:r>
+                        <a:rPr lang="en-US" sz="1200" dirty="0"/>
+                        <a:t>Model</a:t>
+                      </a:r>
+                    </a:p>
+                  </a:txBody>
+                  <a:tcPr/>
+                </a:tc>
+                <a:tc>
+                  <a:txBody>
+                    <a:bodyPr/>
+                    <a:lstStyle/>
+                    <a:p>
+                      <a:r>
+                        <a:rPr lang="en-US" sz="1200" dirty="0"/>
+                        <a:t>Train</a:t>
+                      </a:r>
+                    </a:p>
+                    <a:p>
+                      <a:r>
+                        <a:rPr lang="en-US" sz="1200" dirty="0"/>
+                        <a:t>Accuracy</a:t>
+                      </a:r>
+                    </a:p>
+                  </a:txBody>
+                  <a:tcPr/>
+                </a:tc>
+                <a:tc>
+                  <a:txBody>
+                    <a:bodyPr/>
+                    <a:lstStyle/>
+                    <a:p>
+                      <a:r>
+                        <a:rPr lang="en-US" sz="1200" dirty="0"/>
+                        <a:t>Val Accuracy</a:t>
+                      </a:r>
+                    </a:p>
+                  </a:txBody>
+                  <a:tcPr/>
+                </a:tc>
+                <a:tc>
+                  <a:txBody>
+                    <a:bodyPr/>
+                    <a:lstStyle/>
+                    <a:p>
+                      <a:r>
+                        <a:rPr lang="en-US" sz="1200" dirty="0"/>
+                        <a:t>Train Loss</a:t>
+                      </a:r>
+                    </a:p>
+                  </a:txBody>
+                  <a:tcPr/>
+                </a:tc>
+                <a:tc>
+                  <a:txBody>
+                    <a:bodyPr/>
+                    <a:lstStyle/>
+                    <a:p>
+                      <a:r>
+                        <a:rPr lang="en-US" sz="1200" dirty="0"/>
+                        <a:t>Val Loss</a:t>
+                      </a:r>
+                    </a:p>
+                  </a:txBody>
+                  <a:tcPr/>
+                </a:tc>
+                <a:tc>
+                  <a:txBody>
+                    <a:bodyPr/>
+                    <a:lstStyle/>
+                    <a:p>
+                      <a:r>
+                        <a:rPr lang="en-US" sz="1200" dirty="0"/>
+                        <a:t>Train</a:t>
+                      </a:r>
+                    </a:p>
+                    <a:p>
+                      <a:r>
+                        <a:rPr lang="en-US" sz="1200" dirty="0"/>
+                        <a:t>Precision</a:t>
+                      </a:r>
+                    </a:p>
+                  </a:txBody>
+                  <a:tcPr/>
+                </a:tc>
+                <a:tc>
+                  <a:txBody>
+                    <a:bodyPr/>
+                    <a:lstStyle/>
+                    <a:p>
+                      <a:r>
+                        <a:rPr lang="en-US" sz="1200" dirty="0"/>
+                        <a:t>Train Recall</a:t>
+                      </a:r>
+                    </a:p>
+                  </a:txBody>
+                  <a:tcPr/>
+                </a:tc>
+                <a:tc>
+                  <a:txBody>
+                    <a:bodyPr/>
+                    <a:lstStyle/>
+                    <a:p>
+                      <a:r>
+                        <a:rPr lang="en-US" sz="1200" dirty="0"/>
+                        <a:t>Train</a:t>
+                      </a:r>
+                    </a:p>
+                    <a:p>
+                      <a:r>
+                        <a:rPr lang="en-US" sz="1200" dirty="0"/>
+                        <a:t>F1_Score</a:t>
+                      </a:r>
+                    </a:p>
+                  </a:txBody>
+                  <a:tcPr/>
+                </a:tc>
+                <a:tc>
+                  <a:txBody>
+                    <a:bodyPr/>
+                    <a:lstStyle/>
+                    <a:p>
+                      <a:r>
+                        <a:rPr lang="en-US" sz="1200" dirty="0"/>
+                        <a:t>Train AUC</a:t>
+                      </a:r>
+                    </a:p>
+                  </a:txBody>
+                  <a:tcPr/>
+                </a:tc>
+                <a:tc>
+                  <a:txBody>
+                    <a:bodyPr/>
+                    <a:lstStyle/>
+                    <a:p>
+                      <a:r>
+                        <a:rPr lang="en-US" sz="1200" dirty="0"/>
+                        <a:t>Parameters</a:t>
+                      </a:r>
+                    </a:p>
+                  </a:txBody>
+                  <a:tcPr/>
+                </a:tc>
+                <a:extLst>
+                  <a:ext uri="{0D108BD9-81ED-4DB2-BD59-A6C34878D82A}">
+                    <a16:rowId xmlns:a16="http://schemas.microsoft.com/office/drawing/2014/main" val="714646363"/>
+                  </a:ext>
+                </a:extLst>
+              </a:tr>
+              <a:tr h="419245">
+                <a:tc>
+                  <a:txBody>
+                    <a:bodyPr/>
+                    <a:lstStyle/>
+                    <a:p>
+                      <a:r>
+                        <a:rPr lang="en-US" sz="1200" dirty="0"/>
+                        <a:t>Custom </a:t>
+                      </a:r>
+                    </a:p>
+                    <a:p>
+                      <a:r>
+                        <a:rPr lang="en-US" sz="1200" dirty="0"/>
+                        <a:t>CNN Model</a:t>
+                      </a:r>
+                    </a:p>
+                  </a:txBody>
+                  <a:tcPr/>
+                </a:tc>
+                <a:tc>
+                  <a:txBody>
+                    <a:bodyPr/>
+                    <a:lstStyle/>
+                    <a:p>
+                      <a:r>
+                        <a:rPr lang="en-US" sz="1200" dirty="0"/>
+                        <a:t>77%</a:t>
+                      </a:r>
+                    </a:p>
+                  </a:txBody>
+                  <a:tcPr/>
+                </a:tc>
+                <a:tc>
+                  <a:txBody>
+                    <a:bodyPr/>
+                    <a:lstStyle/>
+                    <a:p>
+                      <a:r>
+                        <a:rPr lang="en-US" sz="1200" dirty="0"/>
+                        <a:t>62%</a:t>
+                      </a:r>
+                    </a:p>
+                  </a:txBody>
+                  <a:tcPr/>
+                </a:tc>
+                <a:tc>
+                  <a:txBody>
+                    <a:bodyPr/>
+                    <a:lstStyle/>
+                    <a:p>
+                      <a:r>
+                        <a:rPr lang="en-US" sz="1200" dirty="0"/>
+                        <a:t>0.70</a:t>
+                      </a:r>
+                    </a:p>
+                  </a:txBody>
+                  <a:tcPr/>
+                </a:tc>
+                <a:tc>
+                  <a:txBody>
+                    <a:bodyPr/>
+                    <a:lstStyle/>
+                    <a:p>
+                      <a:r>
+                        <a:rPr lang="en-US" sz="1200" dirty="0"/>
+                        <a:t>1.17</a:t>
+                      </a:r>
+                    </a:p>
+                  </a:txBody>
+                  <a:tcPr/>
+                </a:tc>
+                <a:tc>
+                  <a:txBody>
+                    <a:bodyPr/>
+                    <a:lstStyle/>
+                    <a:p>
+                      <a:r>
+                        <a:rPr lang="en-US" sz="1200" dirty="0"/>
+                        <a:t>0.83</a:t>
+                      </a:r>
+                    </a:p>
+                  </a:txBody>
+                  <a:tcPr/>
+                </a:tc>
+                <a:tc>
+                  <a:txBody>
+                    <a:bodyPr/>
+                    <a:lstStyle/>
+                    <a:p>
+                      <a:r>
+                        <a:rPr lang="en-US" sz="1200" dirty="0"/>
+                        <a:t>0.70</a:t>
+                      </a:r>
+                    </a:p>
+                  </a:txBody>
+                  <a:tcPr/>
+                </a:tc>
+                <a:tc>
+                  <a:txBody>
+                    <a:bodyPr/>
+                    <a:lstStyle/>
+                    <a:p>
+                      <a:r>
+                        <a:rPr lang="en-US" sz="1200" dirty="0"/>
+                        <a:t>0.76</a:t>
+                      </a:r>
+                    </a:p>
+                  </a:txBody>
+                  <a:tcPr/>
+                </a:tc>
+                <a:tc>
+                  <a:txBody>
+                    <a:bodyPr/>
+                    <a:lstStyle/>
+                    <a:p>
+                      <a:r>
+                        <a:rPr lang="en-US" sz="1200" dirty="0"/>
+                        <a:t>0.96</a:t>
+                      </a:r>
+                    </a:p>
+                  </a:txBody>
+                  <a:tcPr/>
+                </a:tc>
+                <a:tc>
+                  <a:txBody>
+                    <a:bodyPr/>
+                    <a:lstStyle/>
+                    <a:p>
+                      <a:r>
+                        <a:rPr lang="en-US" sz="1200" dirty="0"/>
+                        <a:t>5,050,149</a:t>
+                      </a:r>
+                    </a:p>
+                  </a:txBody>
+                  <a:tcPr/>
+                </a:tc>
+                <a:extLst>
+                  <a:ext uri="{0D108BD9-81ED-4DB2-BD59-A6C34878D82A}">
+                    <a16:rowId xmlns:a16="http://schemas.microsoft.com/office/drawing/2014/main" val="1258041666"/>
+                  </a:ext>
+                </a:extLst>
+              </a:tr>
+              <a:tr h="340055">
+                <a:tc>
+                  <a:txBody>
+                    <a:bodyPr/>
+                    <a:lstStyle/>
+                    <a:p>
+                      <a:r>
+                        <a:rPr lang="en-US" sz="1200" dirty="0"/>
+                        <a:t>VGG16</a:t>
+                      </a:r>
+                    </a:p>
+                  </a:txBody>
+                  <a:tcPr/>
+                </a:tc>
+                <a:tc>
+                  <a:txBody>
+                    <a:bodyPr/>
+                    <a:lstStyle/>
+                    <a:p>
+                      <a:r>
+                        <a:rPr lang="en-US" sz="1200" dirty="0"/>
+                        <a:t>81%</a:t>
+                      </a:r>
+                    </a:p>
+                  </a:txBody>
+                  <a:tcPr/>
+                </a:tc>
+                <a:tc>
+                  <a:txBody>
+                    <a:bodyPr/>
+                    <a:lstStyle/>
+                    <a:p>
+                      <a:r>
+                        <a:rPr lang="en-US" sz="1200" dirty="0"/>
+                        <a:t>66%</a:t>
+                      </a:r>
+                    </a:p>
+                  </a:txBody>
+                  <a:tcPr/>
+                </a:tc>
+                <a:tc>
+                  <a:txBody>
+                    <a:bodyPr/>
+                    <a:lstStyle/>
+                    <a:p>
+                      <a:r>
+                        <a:rPr lang="en-US" sz="1200" dirty="0"/>
+                        <a:t>0.50</a:t>
+                      </a:r>
+                    </a:p>
+                  </a:txBody>
+                  <a:tcPr/>
+                </a:tc>
+                <a:tc>
+                  <a:txBody>
+                    <a:bodyPr/>
+                    <a:lstStyle/>
+                    <a:p>
+                      <a:r>
+                        <a:rPr lang="en-US" sz="1200" dirty="0"/>
+                        <a:t>0.91</a:t>
+                      </a:r>
+                    </a:p>
+                  </a:txBody>
+                  <a:tcPr/>
+                </a:tc>
+                <a:tc>
+                  <a:txBody>
+                    <a:bodyPr/>
+                    <a:lstStyle/>
+                    <a:p>
+                      <a:r>
+                        <a:rPr lang="en-US" sz="1200" dirty="0"/>
+                        <a:t>0.85</a:t>
+                      </a:r>
+                    </a:p>
+                  </a:txBody>
+                  <a:tcPr/>
+                </a:tc>
+                <a:tc>
+                  <a:txBody>
+                    <a:bodyPr/>
+                    <a:lstStyle/>
+                    <a:p>
+                      <a:r>
+                        <a:rPr lang="en-US" sz="1200" dirty="0"/>
+                        <a:t>0.76</a:t>
+                      </a:r>
+                    </a:p>
+                  </a:txBody>
+                  <a:tcPr/>
+                </a:tc>
+                <a:tc>
+                  <a:txBody>
+                    <a:bodyPr/>
+                    <a:lstStyle/>
+                    <a:p>
+                      <a:r>
+                        <a:rPr lang="en-US" sz="1200" dirty="0"/>
+                        <a:t>0.80</a:t>
+                      </a:r>
+                    </a:p>
+                  </a:txBody>
+                  <a:tcPr/>
+                </a:tc>
+                <a:tc>
+                  <a:txBody>
+                    <a:bodyPr/>
+                    <a:lstStyle/>
+                    <a:p>
+                      <a:r>
+                        <a:rPr lang="en-US" sz="1200" dirty="0"/>
+                        <a:t>0.97</a:t>
+                      </a:r>
+                    </a:p>
+                  </a:txBody>
+                  <a:tcPr/>
+                </a:tc>
+                <a:tc>
+                  <a:txBody>
+                    <a:bodyPr/>
+                    <a:lstStyle/>
+                    <a:p>
+                      <a:r>
+                        <a:rPr lang="en-US" sz="1200" dirty="0"/>
+                        <a:t>14,789,205</a:t>
+                      </a:r>
+                    </a:p>
+                  </a:txBody>
+                  <a:tcPr/>
+                </a:tc>
+                <a:extLst>
+                  <a:ext uri="{0D108BD9-81ED-4DB2-BD59-A6C34878D82A}">
+                    <a16:rowId xmlns:a16="http://schemas.microsoft.com/office/drawing/2014/main" val="957144739"/>
+                  </a:ext>
+                </a:extLst>
+              </a:tr>
+              <a:tr h="340055">
+                <a:tc>
+                  <a:txBody>
+                    <a:bodyPr/>
+                    <a:lstStyle/>
+                    <a:p>
+                      <a:r>
+                        <a:rPr lang="en-US" sz="1200" dirty="0"/>
+                        <a:t>ResNet50</a:t>
+                      </a:r>
+                    </a:p>
+                  </a:txBody>
+                  <a:tcPr/>
+                </a:tc>
+                <a:tc>
+                  <a:txBody>
+                    <a:bodyPr/>
+                    <a:lstStyle/>
+                    <a:p>
+                      <a:r>
+                        <a:rPr lang="en-US" sz="1200" dirty="0"/>
+                        <a:t>70%</a:t>
+                      </a:r>
+                    </a:p>
+                  </a:txBody>
+                  <a:tcPr/>
+                </a:tc>
+                <a:tc>
+                  <a:txBody>
+                    <a:bodyPr/>
+                    <a:lstStyle/>
+                    <a:p>
+                      <a:r>
+                        <a:rPr lang="en-US" sz="1200" dirty="0"/>
+                        <a:t>66%</a:t>
+                      </a:r>
+                    </a:p>
+                  </a:txBody>
+                  <a:tcPr/>
+                </a:tc>
+                <a:tc>
+                  <a:txBody>
+                    <a:bodyPr/>
+                    <a:lstStyle/>
+                    <a:p>
+                      <a:r>
+                        <a:rPr lang="en-US" sz="1200" dirty="0"/>
+                        <a:t>0.86</a:t>
+                      </a:r>
+                    </a:p>
+                  </a:txBody>
+                  <a:tcPr/>
+                </a:tc>
+                <a:tc>
+                  <a:txBody>
+                    <a:bodyPr/>
+                    <a:lstStyle/>
+                    <a:p>
+                      <a:r>
+                        <a:rPr lang="en-US" sz="1200" dirty="0"/>
+                        <a:t>0.97</a:t>
+                      </a:r>
+                    </a:p>
+                  </a:txBody>
+                  <a:tcPr/>
+                </a:tc>
+                <a:tc>
+                  <a:txBody>
+                    <a:bodyPr/>
+                    <a:lstStyle/>
+                    <a:p>
+                      <a:r>
+                        <a:rPr lang="en-US" sz="1200" dirty="0"/>
+                        <a:t>0.78</a:t>
+                      </a:r>
+                    </a:p>
+                  </a:txBody>
+                  <a:tcPr/>
+                </a:tc>
+                <a:tc>
+                  <a:txBody>
+                    <a:bodyPr/>
+                    <a:lstStyle/>
+                    <a:p>
+                      <a:r>
+                        <a:rPr lang="en-US" sz="1200" dirty="0"/>
+                        <a:t>0.58</a:t>
+                      </a:r>
+                    </a:p>
+                  </a:txBody>
+                  <a:tcPr/>
+                </a:tc>
+                <a:tc>
+                  <a:txBody>
+                    <a:bodyPr/>
+                    <a:lstStyle/>
+                    <a:p>
+                      <a:r>
+                        <a:rPr lang="en-US" sz="1200" dirty="0"/>
+                        <a:t>0.67 </a:t>
+                      </a:r>
+                    </a:p>
+                  </a:txBody>
+                  <a:tcPr/>
+                </a:tc>
+                <a:tc>
+                  <a:txBody>
+                    <a:bodyPr/>
+                    <a:lstStyle/>
+                    <a:p>
+                      <a:r>
+                        <a:rPr lang="en-US" sz="1200" dirty="0"/>
+                        <a:t>0.93</a:t>
+                      </a:r>
+                    </a:p>
+                  </a:txBody>
+                  <a:tcPr/>
+                </a:tc>
+                <a:tc>
+                  <a:txBody>
+                    <a:bodyPr/>
+                    <a:lstStyle/>
+                    <a:p>
+                      <a:r>
+                        <a:rPr lang="en-US" sz="1200" dirty="0"/>
+                        <a:t>25,826,693</a:t>
+                      </a:r>
+                    </a:p>
+                  </a:txBody>
+                  <a:tcPr/>
+                </a:tc>
+                <a:extLst>
+                  <a:ext uri="{0D108BD9-81ED-4DB2-BD59-A6C34878D82A}">
+                    <a16:rowId xmlns:a16="http://schemas.microsoft.com/office/drawing/2014/main" val="1762348993"/>
+                  </a:ext>
+                </a:extLst>
+              </a:tr>
+            </a:tbl>
+          </a:graphicData>
+        </a:graphic>
+      </p:graphicFrame>
+    </p:spTree>
+    <p:extLst>
+      <p:ext uri="{BB962C8B-B14F-4D97-AF65-F5344CB8AC3E}">
+        <p14:creationId xmlns:p14="http://schemas.microsoft.com/office/powerpoint/2010/main" val="1860712933"/>
       </p:ext>
     </p:extLst>
   </p:cSld>

</xml_diff>

<commit_message>
added InceptionV3 results in visualization section
</commit_message>
<xml_diff>
--- a/Blindness Detection Presentation.pptx
+++ b/Blindness Detection Presentation.pptx
@@ -21366,10 +21366,10 @@
       </p:pic>
       <p:pic>
         <p:nvPicPr>
-          <p:cNvPr id="11" name="Picture 10">
+          <p:cNvPr id="15" name="Picture 14">
             <a:extLst>
               <a:ext uri="{FF2B5EF4-FFF2-40B4-BE49-F238E27FC236}">
-                <a16:creationId xmlns:a16="http://schemas.microsoft.com/office/drawing/2014/main" id="{7106EC43-61D9-6240-15AF-FB474F4886FA}"/>
+                <a16:creationId xmlns:a16="http://schemas.microsoft.com/office/drawing/2014/main" id="{34556110-9AA8-4EE4-6D94-F9C03991262B}"/>
               </a:ext>
             </a:extLst>
           </p:cNvPr>
@@ -21378,15 +21378,16 @@
           </p:cNvPicPr>
           <p:nvPr/>
         </p:nvPicPr>
-        <p:blipFill rotWithShape="1">
-          <a:blip r:embed="rId3"/>
-          <a:srcRect t="65840"/>
-          <a:stretch/>
+        <p:blipFill>
+          <a:blip r:embed="rId4"/>
+          <a:stretch>
+            <a:fillRect/>
+          </a:stretch>
         </p:blipFill>
         <p:spPr>
           <a:xfrm>
-            <a:off x="5039395" y="1047307"/>
-            <a:ext cx="3722270" cy="1757030"/>
+            <a:off x="5136033" y="1041482"/>
+            <a:ext cx="3603422" cy="3371030"/>
           </a:xfrm>
           <a:prstGeom prst="rect">
             <a:avLst/>

</xml_diff>